<commit_message>
added bioinfosummer 2017 plug
</commit_message>
<xml_diff>
--- a/IntroToIntoToR.pptx
+++ b/IntroToIntoToR.pptx
@@ -6,7 +6,7 @@
     <p:sldMasterId id="2147483683" r:id="rId2"/>
   </p:sldMasterIdLst>
   <p:notesMasterIdLst>
-    <p:notesMasterId r:id="rId17"/>
+    <p:notesMasterId r:id="rId18"/>
   </p:notesMasterIdLst>
   <p:sldIdLst>
     <p:sldId id="256" r:id="rId3"/>
@@ -21,8 +21,9 @@
     <p:sldId id="265" r:id="rId12"/>
     <p:sldId id="266" r:id="rId13"/>
     <p:sldId id="267" r:id="rId14"/>
-    <p:sldId id="268" r:id="rId15"/>
-    <p:sldId id="269" r:id="rId16"/>
+    <p:sldId id="270" r:id="rId15"/>
+    <p:sldId id="268" r:id="rId16"/>
+    <p:sldId id="269" r:id="rId17"/>
   </p:sldIdLst>
   <p:sldSz cx="9144000" cy="6858000" type="screen4x3"/>
   <p:notesSz cx="6858000" cy="9144000"/>
@@ -4977,6 +4978,89 @@
       </p:grpSpPr>
       <p:sp>
         <p:nvSpPr>
+          <p:cNvPr id="3" name="Title 2"/>
+          <p:cNvSpPr>
+            <a:spLocks noGrp="1"/>
+          </p:cNvSpPr>
+          <p:nvPr>
+            <p:ph type="title"/>
+          </p:nvPr>
+        </p:nvSpPr>
+        <p:spPr/>
+        <p:txBody>
+          <a:bodyPr/>
+          <a:lstStyle/>
+          <a:p>
+            <a:r>
+              <a:rPr lang="en-US" dirty="0" smtClean="0"/>
+              <a:t>Shameless plug</a:t>
+            </a:r>
+            <a:endParaRPr lang="en-US" dirty="0"/>
+          </a:p>
+        </p:txBody>
+      </p:sp>
+      <p:pic>
+        <p:nvPicPr>
+          <p:cNvPr id="4" name="Picture 3"/>
+          <p:cNvPicPr>
+            <a:picLocks noChangeAspect="1"/>
+          </p:cNvPicPr>
+          <p:nvPr/>
+        </p:nvPicPr>
+        <p:blipFill>
+          <a:blip r:embed="rId2">
+            <a:extLst>
+              <a:ext uri="{28A0092B-C50C-407E-A947-70E740481C1C}">
+                <a14:useLocalDpi xmlns:a14="http://schemas.microsoft.com/office/drawing/2010/main" val="0"/>
+              </a:ext>
+            </a:extLst>
+          </a:blip>
+          <a:stretch>
+            <a:fillRect/>
+          </a:stretch>
+        </p:blipFill>
+        <p:spPr>
+          <a:xfrm>
+            <a:off x="0" y="850900"/>
+            <a:ext cx="9144000" cy="5145024"/>
+          </a:xfrm>
+          <a:prstGeom prst="rect">
+            <a:avLst/>
+          </a:prstGeom>
+        </p:spPr>
+      </p:pic>
+    </p:spTree>
+    <p:extLst>
+      <p:ext uri="{BB962C8B-B14F-4D97-AF65-F5344CB8AC3E}">
+        <p14:creationId xmlns:p14="http://schemas.microsoft.com/office/powerpoint/2010/main" val="977746848"/>
+      </p:ext>
+    </p:extLst>
+  </p:cSld>
+  <p:clrMapOvr>
+    <a:masterClrMapping/>
+  </p:clrMapOvr>
+</p:sld>
+</file>
+
+<file path=ppt/slides/slide14.xml><?xml version="1.0" encoding="utf-8"?>
+<p:sld xmlns:a="http://schemas.openxmlformats.org/drawingml/2006/main" xmlns:r="http://schemas.openxmlformats.org/officeDocument/2006/relationships" xmlns:p="http://schemas.openxmlformats.org/presentationml/2006/main">
+  <p:cSld>
+    <p:spTree>
+      <p:nvGrpSpPr>
+        <p:cNvPr id="1" name=""/>
+        <p:cNvGrpSpPr/>
+        <p:nvPr/>
+      </p:nvGrpSpPr>
+      <p:grpSpPr>
+        <a:xfrm>
+          <a:off x="0" y="0"/>
+          <a:ext cx="0" cy="0"/>
+          <a:chOff x="0" y="0"/>
+          <a:chExt cx="0" cy="0"/>
+        </a:xfrm>
+      </p:grpSpPr>
+      <p:sp>
+        <p:nvSpPr>
           <p:cNvPr id="2" name="Text Placeholder 1"/>
           <p:cNvSpPr>
             <a:spLocks noGrp="1"/>
@@ -5042,7 +5126,7 @@
 </p:sld>
 </file>
 
-<file path=ppt/slides/slide14.xml><?xml version="1.0" encoding="utf-8"?>
+<file path=ppt/slides/slide15.xml><?xml version="1.0" encoding="utf-8"?>
 <p:sld xmlns:a="http://schemas.openxmlformats.org/drawingml/2006/main" xmlns:r="http://schemas.openxmlformats.org/officeDocument/2006/relationships" xmlns:p="http://schemas.openxmlformats.org/presentationml/2006/main">
   <p:cSld>
     <p:spTree>

</xml_diff>

<commit_message>
modifed and added slide on what is not covered
</commit_message>
<xml_diff>
--- a/IntroToIntoToR.pptx
+++ b/IntroToIntoToR.pptx
@@ -6,7 +6,7 @@
     <p:sldMasterId id="2147483683" r:id="rId2"/>
   </p:sldMasterIdLst>
   <p:notesMasterIdLst>
-    <p:notesMasterId r:id="rId18"/>
+    <p:notesMasterId r:id="rId19"/>
   </p:notesMasterIdLst>
   <p:sldIdLst>
     <p:sldId id="256" r:id="rId3"/>
@@ -19,11 +19,12 @@
     <p:sldId id="263" r:id="rId10"/>
     <p:sldId id="264" r:id="rId11"/>
     <p:sldId id="265" r:id="rId12"/>
-    <p:sldId id="266" r:id="rId13"/>
-    <p:sldId id="267" r:id="rId14"/>
-    <p:sldId id="270" r:id="rId15"/>
-    <p:sldId id="268" r:id="rId16"/>
-    <p:sldId id="269" r:id="rId17"/>
+    <p:sldId id="271" r:id="rId13"/>
+    <p:sldId id="266" r:id="rId14"/>
+    <p:sldId id="267" r:id="rId15"/>
+    <p:sldId id="270" r:id="rId16"/>
+    <p:sldId id="268" r:id="rId17"/>
+    <p:sldId id="269" r:id="rId18"/>
   </p:sldIdLst>
   <p:sldSz cx="9144000" cy="6858000" type="screen4x3"/>
   <p:notesSz cx="6858000" cy="9144000"/>
@@ -229,6 +230,11 @@
       </a:defRPr>
     </a:lvl9pPr>
   </p:defaultTextStyle>
+  <p:extLst>
+    <p:ext uri="{EFAFB233-063F-42B5-8137-9DF3F51BA10A}">
+      <p15:sldGuideLst xmlns:p15="http://schemas.microsoft.com/office/powerpoint/2012/main"/>
+    </p:ext>
+  </p:extLst>
 </p:presentation>
 </file>
 
@@ -4773,7 +4779,60 @@
           <a:p>
             <a:r>
               <a:rPr lang="en-US" dirty="0" smtClean="0"/>
-              <a:t>Sticky notes</a:t>
+              <a:t>Things we won’t be covering but are of note:</a:t>
+            </a:r>
+          </a:p>
+          <a:p>
+            <a:pPr lvl="1"/>
+            <a:r>
+              <a:rPr lang="en-US" dirty="0" smtClean="0"/>
+              <a:t>Statistical modelling (lm, </a:t>
+            </a:r>
+            <a:r>
+              <a:rPr lang="en-US" dirty="0" err="1" smtClean="0"/>
+              <a:t>glm</a:t>
+            </a:r>
+            <a:r>
+              <a:rPr lang="mr-IN" dirty="0" smtClean="0"/>
+              <a:t>……</a:t>
+            </a:r>
+            <a:r>
+              <a:rPr lang="en-AU" dirty="0" smtClean="0"/>
+              <a:t>).</a:t>
+            </a:r>
+          </a:p>
+          <a:p>
+            <a:pPr lvl="1"/>
+            <a:r>
+              <a:rPr lang="en-AU" dirty="0" smtClean="0"/>
+              <a:t>Packages specific to bioinformatics.</a:t>
+            </a:r>
+          </a:p>
+          <a:p>
+            <a:pPr lvl="1"/>
+            <a:r>
+              <a:rPr lang="en-AU" dirty="0" err="1" smtClean="0"/>
+              <a:t>Tidyverse</a:t>
+            </a:r>
+            <a:r>
+              <a:rPr lang="en-AU" dirty="0" smtClean="0"/>
+              <a:t> and </a:t>
+            </a:r>
+            <a:r>
+              <a:rPr lang="en-AU" dirty="0" err="1" smtClean="0"/>
+              <a:t>Tidyr</a:t>
+            </a:r>
+            <a:r>
+              <a:rPr lang="en-AU" dirty="0" smtClean="0"/>
+              <a:t> (except </a:t>
+            </a:r>
+            <a:r>
+              <a:rPr lang="en-AU" dirty="0" err="1" smtClean="0"/>
+              <a:t>ggplots</a:t>
+            </a:r>
+            <a:r>
+              <a:rPr lang="en-AU" dirty="0" smtClean="0"/>
+              <a:t>)</a:t>
             </a:r>
             <a:endParaRPr lang="en-US" dirty="0"/>
           </a:p>
@@ -4796,23 +4855,7 @@
           <a:p>
             <a:r>
               <a:rPr lang="en-US" dirty="0" smtClean="0"/>
-              <a:t>How today’s workshop works </a:t>
-            </a:r>
-            <a:r>
-              <a:rPr lang="mr-IN" dirty="0" smtClean="0"/>
-              <a:t>–</a:t>
-            </a:r>
-            <a:r>
-              <a:rPr lang="en-US" dirty="0" smtClean="0"/>
-              <a:t> </a:t>
-            </a:r>
-            <a:r>
-              <a:rPr lang="en-US" dirty="0" err="1" smtClean="0"/>
-              <a:t>signalling</a:t>
-            </a:r>
-            <a:r>
-              <a:rPr lang="en-US" dirty="0" smtClean="0"/>
-              <a:t> for help</a:t>
+              <a:t>What we won’t be covering but are important in the interest of time.</a:t>
             </a:r>
             <a:endParaRPr lang="en-US" dirty="0"/>
           </a:p>
@@ -4821,7 +4864,7 @@
     </p:spTree>
     <p:extLst>
       <p:ext uri="{BB962C8B-B14F-4D97-AF65-F5344CB8AC3E}">
-        <p14:creationId xmlns:p14="http://schemas.microsoft.com/office/powerpoint/2010/main" val="182367093"/>
+        <p14:creationId xmlns:p14="http://schemas.microsoft.com/office/powerpoint/2010/main" val="154571930"/>
       </p:ext>
     </p:extLst>
   </p:cSld>
@@ -4865,61 +4908,9 @@
           <a:p>
             <a:r>
               <a:rPr lang="en-US" dirty="0" smtClean="0"/>
-              <a:t>This is the start of your R journey, many others are at the same stage, share your questions.</a:t>
-            </a:r>
-          </a:p>
-          <a:p>
-            <a:r>
-              <a:rPr lang="en-US" dirty="0" smtClean="0"/>
-              <a:t>Attend this workshop again, and others we offer</a:t>
-            </a:r>
-          </a:p>
-          <a:p>
-            <a:pPr lvl="1"/>
-            <a:r>
-              <a:rPr lang="en-US" dirty="0" smtClean="0"/>
-              <a:t>Advanced R</a:t>
-            </a:r>
-          </a:p>
-          <a:p>
-            <a:pPr lvl="1"/>
-            <a:r>
-              <a:rPr lang="en-US" dirty="0" err="1" smtClean="0"/>
-              <a:t>Specialised</a:t>
-            </a:r>
-            <a:r>
-              <a:rPr lang="en-US" dirty="0" smtClean="0"/>
-              <a:t> use-cases with R (</a:t>
-            </a:r>
-            <a:r>
-              <a:rPr lang="en-US" dirty="0" err="1" smtClean="0"/>
-              <a:t>eg</a:t>
-            </a:r>
-            <a:r>
-              <a:rPr lang="en-US" dirty="0" smtClean="0"/>
-              <a:t>: </a:t>
-            </a:r>
-            <a:r>
-              <a:rPr lang="en-US" dirty="0" err="1" smtClean="0"/>
-              <a:t>RNASeq</a:t>
-            </a:r>
-            <a:r>
-              <a:rPr lang="en-US" dirty="0" smtClean="0"/>
-              <a:t>)</a:t>
-            </a:r>
-          </a:p>
-          <a:p>
-            <a:r>
-              <a:rPr lang="en-US" dirty="0" smtClean="0"/>
-              <a:t>MBP have Friday help sessions at Clayton 3:30pm.</a:t>
-            </a:r>
-          </a:p>
-          <a:p>
-            <a:pPr lvl="1"/>
-            <a:r>
-              <a:rPr lang="en-US" dirty="0" smtClean="0"/>
-              <a:t>Alfred to be determined, contact Nick for questions. </a:t>
-            </a:r>
+              <a:t>Sticky notes</a:t>
+            </a:r>
+            <a:endParaRPr lang="en-US" dirty="0"/>
           </a:p>
         </p:txBody>
       </p:sp>
@@ -4940,6 +4931,150 @@
           <a:p>
             <a:r>
               <a:rPr lang="en-US" dirty="0" smtClean="0"/>
+              <a:t>How today’s workshop works </a:t>
+            </a:r>
+            <a:r>
+              <a:rPr lang="mr-IN" dirty="0" smtClean="0"/>
+              <a:t>–</a:t>
+            </a:r>
+            <a:r>
+              <a:rPr lang="en-US" dirty="0" smtClean="0"/>
+              <a:t> </a:t>
+            </a:r>
+            <a:r>
+              <a:rPr lang="en-US" dirty="0" err="1" smtClean="0"/>
+              <a:t>signalling</a:t>
+            </a:r>
+            <a:r>
+              <a:rPr lang="en-US" dirty="0" smtClean="0"/>
+              <a:t> for help</a:t>
+            </a:r>
+            <a:endParaRPr lang="en-US" dirty="0"/>
+          </a:p>
+        </p:txBody>
+      </p:sp>
+    </p:spTree>
+    <p:extLst>
+      <p:ext uri="{BB962C8B-B14F-4D97-AF65-F5344CB8AC3E}">
+        <p14:creationId xmlns:p14="http://schemas.microsoft.com/office/powerpoint/2010/main" val="182367093"/>
+      </p:ext>
+    </p:extLst>
+  </p:cSld>
+  <p:clrMapOvr>
+    <a:masterClrMapping/>
+  </p:clrMapOvr>
+</p:sld>
+</file>
+
+<file path=ppt/slides/slide13.xml><?xml version="1.0" encoding="utf-8"?>
+<p:sld xmlns:a="http://schemas.openxmlformats.org/drawingml/2006/main" xmlns:r="http://schemas.openxmlformats.org/officeDocument/2006/relationships" xmlns:p="http://schemas.openxmlformats.org/presentationml/2006/main">
+  <p:cSld>
+    <p:spTree>
+      <p:nvGrpSpPr>
+        <p:cNvPr id="1" name=""/>
+        <p:cNvGrpSpPr/>
+        <p:nvPr/>
+      </p:nvGrpSpPr>
+      <p:grpSpPr>
+        <a:xfrm>
+          <a:off x="0" y="0"/>
+          <a:ext cx="0" cy="0"/>
+          <a:chOff x="0" y="0"/>
+          <a:chExt cx="0" cy="0"/>
+        </a:xfrm>
+      </p:grpSpPr>
+      <p:sp>
+        <p:nvSpPr>
+          <p:cNvPr id="2" name="Text Placeholder 1"/>
+          <p:cNvSpPr>
+            <a:spLocks noGrp="1"/>
+          </p:cNvSpPr>
+          <p:nvPr>
+            <p:ph type="body" idx="1"/>
+          </p:nvPr>
+        </p:nvSpPr>
+        <p:spPr/>
+        <p:txBody>
+          <a:bodyPr/>
+          <a:lstStyle/>
+          <a:p>
+            <a:r>
+              <a:rPr lang="en-US" dirty="0" smtClean="0"/>
+              <a:t>This is the start of your R journey, many others are at the same stage, share your questions.</a:t>
+            </a:r>
+          </a:p>
+          <a:p>
+            <a:r>
+              <a:rPr lang="en-US" dirty="0" smtClean="0"/>
+              <a:t>Attend this workshop again, and others we offer</a:t>
+            </a:r>
+          </a:p>
+          <a:p>
+            <a:pPr lvl="1"/>
+            <a:r>
+              <a:rPr lang="en-US" dirty="0" smtClean="0"/>
+              <a:t>Advanced R</a:t>
+            </a:r>
+          </a:p>
+          <a:p>
+            <a:pPr lvl="1"/>
+            <a:r>
+              <a:rPr lang="en-US" dirty="0" err="1" smtClean="0"/>
+              <a:t>Specialised</a:t>
+            </a:r>
+            <a:r>
+              <a:rPr lang="en-US" dirty="0" smtClean="0"/>
+              <a:t> use-cases with R (</a:t>
+            </a:r>
+            <a:r>
+              <a:rPr lang="en-US" dirty="0" err="1" smtClean="0"/>
+              <a:t>eg</a:t>
+            </a:r>
+            <a:r>
+              <a:rPr lang="en-US" dirty="0" smtClean="0"/>
+              <a:t>: </a:t>
+            </a:r>
+            <a:r>
+              <a:rPr lang="en-US" dirty="0" err="1" smtClean="0"/>
+              <a:t>RNASeq</a:t>
+            </a:r>
+            <a:r>
+              <a:rPr lang="en-US" dirty="0" smtClean="0"/>
+              <a:t>)</a:t>
+            </a:r>
+          </a:p>
+          <a:p>
+            <a:r>
+              <a:rPr lang="en-US" dirty="0" smtClean="0"/>
+              <a:t>MBP have Friday help sessions at Clayton 3:30pm.</a:t>
+            </a:r>
+          </a:p>
+          <a:p>
+            <a:pPr lvl="1"/>
+            <a:r>
+              <a:rPr lang="en-US" dirty="0" smtClean="0"/>
+              <a:t>Alfred to be determined, contact Nick for questions. </a:t>
+            </a:r>
+          </a:p>
+        </p:txBody>
+      </p:sp>
+      <p:sp>
+        <p:nvSpPr>
+          <p:cNvPr id="3" name="Title 2"/>
+          <p:cNvSpPr>
+            <a:spLocks noGrp="1"/>
+          </p:cNvSpPr>
+          <p:nvPr>
+            <p:ph type="title"/>
+          </p:nvPr>
+        </p:nvSpPr>
+        <p:spPr/>
+        <p:txBody>
+          <a:bodyPr/>
+          <a:lstStyle/>
+          <a:p>
+            <a:r>
+              <a:rPr lang="en-US" dirty="0" smtClean="0"/>
               <a:t>Rounding up</a:t>
             </a:r>
             <a:endParaRPr lang="en-US" dirty="0"/>
@@ -4959,7 +5094,7 @@
 </p:sld>
 </file>
 
-<file path=ppt/slides/slide13.xml><?xml version="1.0" encoding="utf-8"?>
+<file path=ppt/slides/slide14.xml><?xml version="1.0" encoding="utf-8"?>
 <p:sld xmlns:a="http://schemas.openxmlformats.org/drawingml/2006/main" xmlns:r="http://schemas.openxmlformats.org/officeDocument/2006/relationships" xmlns:p="http://schemas.openxmlformats.org/presentationml/2006/main">
   <p:cSld>
     <p:spTree>
@@ -5042,7 +5177,7 @@
 </p:sld>
 </file>
 
-<file path=ppt/slides/slide14.xml><?xml version="1.0" encoding="utf-8"?>
+<file path=ppt/slides/slide15.xml><?xml version="1.0" encoding="utf-8"?>
 <p:sld xmlns:a="http://schemas.openxmlformats.org/drawingml/2006/main" xmlns:r="http://schemas.openxmlformats.org/officeDocument/2006/relationships" xmlns:p="http://schemas.openxmlformats.org/presentationml/2006/main">
   <p:cSld>
     <p:spTree>
@@ -5113,6 +5248,36 @@
           </a:p>
         </p:txBody>
       </p:sp>
+      <p:pic>
+        <p:nvPicPr>
+          <p:cNvPr id="4" name="Picture 3"/>
+          <p:cNvPicPr>
+            <a:picLocks noChangeAspect="1"/>
+          </p:cNvPicPr>
+          <p:nvPr/>
+        </p:nvPicPr>
+        <p:blipFill>
+          <a:blip r:embed="rId2">
+            <a:extLst>
+              <a:ext uri="{28A0092B-C50C-407E-A947-70E740481C1C}">
+                <a14:useLocalDpi xmlns:a14="http://schemas.microsoft.com/office/drawing/2010/main" val="0"/>
+              </a:ext>
+            </a:extLst>
+          </a:blip>
+          <a:stretch>
+            <a:fillRect/>
+          </a:stretch>
+        </p:blipFill>
+        <p:spPr>
+          <a:xfrm>
+            <a:off x="1924220" y="2272698"/>
+            <a:ext cx="5546811" cy="3700763"/>
+          </a:xfrm>
+          <a:prstGeom prst="rect">
+            <a:avLst/>
+          </a:prstGeom>
+        </p:spPr>
+      </p:pic>
     </p:spTree>
     <p:extLst>
       <p:ext uri="{BB962C8B-B14F-4D97-AF65-F5344CB8AC3E}">
@@ -5126,7 +5291,7 @@
 </p:sld>
 </file>
 
-<file path=ppt/slides/slide15.xml><?xml version="1.0" encoding="utf-8"?>
+<file path=ppt/slides/slide16.xml><?xml version="1.0" encoding="utf-8"?>
 <p:sld xmlns:a="http://schemas.openxmlformats.org/drawingml/2006/main" xmlns:r="http://schemas.openxmlformats.org/officeDocument/2006/relationships" xmlns:p="http://schemas.openxmlformats.org/presentationml/2006/main">
   <p:cSld>
     <p:spTree>
@@ -5294,7 +5459,6 @@
               <a:rPr lang="en-US" dirty="0"/>
               <a:t>to R </a:t>
             </a:r>
-            <a:endParaRPr lang="en-US" dirty="0"/>
           </a:p>
           <a:p>
             <a:r>
@@ -5316,7 +5480,6 @@
               <a:rPr lang="en-US" dirty="0"/>
               <a:t>plotting </a:t>
             </a:r>
-            <a:endParaRPr lang="en-US" dirty="0"/>
           </a:p>
           <a:p>
             <a:r>
@@ -5327,7 +5490,6 @@
               <a:rPr lang="en-US" dirty="0"/>
               <a:t>to find more information for a specific task </a:t>
             </a:r>
-            <a:endParaRPr lang="en-US" dirty="0"/>
           </a:p>
           <a:p>
             <a:r>
@@ -5338,7 +5500,6 @@
               <a:rPr lang="en-US" dirty="0"/>
               <a:t>start of the journey, a network of R learners/users around you. </a:t>
             </a:r>
-            <a:endParaRPr lang="en-US" dirty="0"/>
           </a:p>
           <a:p>
             <a:r>
@@ -5357,7 +5518,6 @@
               <a:rPr lang="en-US" dirty="0"/>
               <a:t> uses of R for your research. </a:t>
             </a:r>
-            <a:endParaRPr lang="en-US" dirty="0"/>
           </a:p>
           <a:p>
             <a:endParaRPr lang="en-US" dirty="0"/>

</xml_diff>